<commit_message>
reprise des bug daffichage
</commit_message>
<xml_diff>
--- a/Presentation Oral/Présentation Avril.pptx
+++ b/Presentation Oral/Présentation Avril.pptx
@@ -124,6 +124,11 @@
       </a:defRPr>
     </a:lvl9pPr>
   </p:defaultTextStyle>
+  <p:extLst>
+    <p:ext uri="{EFAFB233-063F-42B5-8137-9DF3F51BA10A}">
+      <p15:sldGuideLst xmlns:p15="http://schemas.microsoft.com/office/powerpoint/2012/main"/>
+    </p:ext>
+  </p:extLst>
 </p:presentation>
 </file>
 
@@ -6509,6 +6514,7 @@
               </a:defRPr>
             </a:pPr>
             <a:fld id="{69862F0C-E17E-4F0A-89DE-CE379C0F2461}" type="slidenum">
+              <a:rPr/>
               <a:t>10</a:t>
             </a:fld>
             <a:endParaRPr lang="en-US" sz="1200" b="0" i="0" u="none" strike="noStrike" kern="1200" cap="none" spc="0" baseline="0">
@@ -6878,14 +6884,15 @@
           </a:prstGeom>
           <a:gradFill>
             <a:gsLst>
+              <a:gs pos="100000">
+                <a:schemeClr val="bg1"/>
+              </a:gs>
+              <a:gs pos="50000">
+                <a:srgbClr val="FFFFFF"/>
+              </a:gs>
               <a:gs pos="0">
                 <a:srgbClr val="FFFFFF">
                   <a:alpha val="0"/>
-                </a:srgbClr>
-              </a:gs>
-              <a:gs pos="100000">
-                <a:srgbClr val="FFFFFF">
-                  <a:alpha val="38000"/>
                 </a:srgbClr>
               </a:gs>
             </a:gsLst>
@@ -6921,7 +6928,7 @@
                 <a:uFillTx/>
               </a:defRPr>
             </a:pPr>
-            <a:endParaRPr lang="en-US" sz="1800" b="0" i="0" u="none" strike="noStrike" kern="1200" cap="none" spc="0" baseline="0">
+            <a:endParaRPr lang="en-US" sz="1800" b="0" i="0" u="none" strike="noStrike" kern="1200" cap="none" spc="0" baseline="0" dirty="0">
               <a:solidFill>
                 <a:srgbClr val="FFFFFF"/>
               </a:solidFill>
@@ -6963,7 +6970,7 @@
               </a:lnSpc>
             </a:pPr>
             <a:r>
-              <a:rPr lang="en-US" sz="2800"/>
+              <a:rPr lang="en-US" sz="2800" dirty="0"/>
               <a:t>La carte interactive</a:t>
             </a:r>
           </a:p>
@@ -7183,6 +7190,7 @@
               </a:defRPr>
             </a:pPr>
             <a:fld id="{1513A15B-3432-45CC-AB3D-6291B8DAC46B}" type="slidenum">
+              <a:rPr/>
               <a:t>11</a:t>
             </a:fld>
             <a:endParaRPr lang="en-US" sz="1200" b="0" i="0" u="none" strike="noStrike" kern="1200" cap="none" spc="0" baseline="0">
@@ -7876,6 +7884,7 @@
               </a:defRPr>
             </a:pPr>
             <a:fld id="{710F9AE7-AD66-4759-92AF-2DCCAD04E169}" type="slidenum">
+              <a:rPr/>
               <a:t>12</a:t>
             </a:fld>
             <a:endParaRPr lang="en-US" sz="1200" b="0" i="0" u="none" strike="noStrike" kern="1200" cap="none" spc="0" baseline="0">
@@ -8535,6 +8544,7 @@
               </a:defRPr>
             </a:pPr>
             <a:fld id="{D6122FC7-5C0F-4E20-958C-CEB4E16653BA}" type="slidenum">
+              <a:rPr/>
               <a:t>13</a:t>
             </a:fld>
             <a:endParaRPr lang="en-US" sz="1200" b="0" i="0" u="none" strike="noStrike" kern="1200" cap="none" spc="0" baseline="0">
@@ -10300,6 +10310,7 @@
               </a:defRPr>
             </a:pPr>
             <a:fld id="{932BC5F5-21B0-4B71-B43E-2284FFFF9C28}" type="slidenum">
+              <a:rPr/>
               <a:t>18</a:t>
             </a:fld>
             <a:endParaRPr lang="en-US" sz="1200" b="0" i="0" u="none" strike="noStrike" kern="1200" cap="none" spc="0" baseline="0">
@@ -11872,7 +11883,7 @@
             </a:ln>
           </p:spPr>
           <p:txBody>
-            <a:bodyPr vert="horz" wrap="square" lIns="101973" tIns="101973" rIns="101973" bIns="101973" anchor="ctr" anchorCtr="0" compatLnSpc="1">
+            <a:bodyPr vert="horz" wrap="square" lIns="101973" tIns="101973" rIns="101973" bIns="101973" numCol="2" anchor="ctr" anchorCtr="0" compatLnSpc="1">
               <a:noAutofit/>
             </a:bodyPr>
             <a:lstStyle/>
@@ -11897,7 +11908,7 @@
                 </a:defRPr>
               </a:pPr>
               <a:r>
-                <a:rPr lang="fr-FR" sz="1100" b="0" i="0" u="none" strike="noStrike" kern="1200" cap="none" spc="0" baseline="0">
+                <a:rPr lang="fr-FR" sz="1100" b="0" i="0" u="none" strike="noStrike" kern="1200" cap="none" spc="0" baseline="0" dirty="0">
                   <a:solidFill>
                     <a:srgbClr val="000000"/>
                   </a:solidFill>
@@ -11906,7 +11917,7 @@
                 </a:rPr>
                 <a:t>Recherche de données</a:t>
               </a:r>
-              <a:endParaRPr lang="en-US" sz="1100" b="0" i="0" u="none" strike="noStrike" kern="1200" cap="none" spc="0" baseline="0">
+              <a:endParaRPr lang="en-US" sz="1100" b="0" i="0" u="none" strike="noStrike" kern="1200" cap="none" spc="0" baseline="0" dirty="0">
                 <a:solidFill>
                   <a:srgbClr val="000000"/>
                 </a:solidFill>
@@ -11935,7 +11946,7 @@
                 </a:defRPr>
               </a:pPr>
               <a:r>
-                <a:rPr lang="fr-FR" sz="1100" b="0" i="0" u="none" strike="noStrike" kern="1200" cap="none" spc="0" baseline="0">
+                <a:rPr lang="fr-FR" sz="1100" b="0" i="0" u="none" strike="noStrike" kern="1200" cap="none" spc="0" baseline="0" dirty="0">
                   <a:solidFill>
                     <a:srgbClr val="000000"/>
                   </a:solidFill>
@@ -11944,7 +11955,7 @@
                 </a:rPr>
                 <a:t>Site web</a:t>
               </a:r>
-              <a:endParaRPr lang="en-US" sz="1100" b="0" i="0" u="none" strike="noStrike" kern="1200" cap="none" spc="0" baseline="0">
+              <a:endParaRPr lang="en-US" sz="1100" b="0" i="0" u="none" strike="noStrike" kern="1200" cap="none" spc="0" baseline="0" dirty="0">
                 <a:solidFill>
                   <a:srgbClr val="000000"/>
                 </a:solidFill>
@@ -11973,7 +11984,7 @@
                 </a:defRPr>
               </a:pPr>
               <a:r>
-                <a:rPr lang="fr-FR" sz="1100" b="0" i="0" u="none" strike="noStrike" kern="1200" cap="none" spc="0" baseline="0">
+                <a:rPr lang="fr-FR" sz="1100" b="0" i="0" u="none" strike="noStrike" kern="1200" cap="none" spc="0" baseline="0" dirty="0">
                   <a:solidFill>
                     <a:srgbClr val="000000"/>
                   </a:solidFill>
@@ -11982,7 +11993,7 @@
                 </a:rPr>
                 <a:t>Mapping</a:t>
               </a:r>
-              <a:endParaRPr lang="en-US" sz="1100" b="0" i="0" u="none" strike="noStrike" kern="1200" cap="none" spc="0" baseline="0">
+              <a:endParaRPr lang="en-US" sz="1100" b="0" i="0" u="none" strike="noStrike" kern="1200" cap="none" spc="0" baseline="0" dirty="0">
                 <a:solidFill>
                   <a:srgbClr val="000000"/>
                 </a:solidFill>
@@ -12011,7 +12022,7 @@
                 </a:defRPr>
               </a:pPr>
               <a:r>
-                <a:rPr lang="fr-FR" sz="1100" b="0" i="0" u="none" strike="noStrike" kern="1200" cap="none" spc="0" baseline="0">
+                <a:rPr lang="fr-FR" sz="1100" b="0" i="0" u="none" strike="noStrike" kern="1200" cap="none" spc="0" baseline="0" dirty="0">
                   <a:solidFill>
                     <a:srgbClr val="000000"/>
                   </a:solidFill>
@@ -12020,7 +12031,7 @@
                 </a:rPr>
                 <a:t>Scrapping</a:t>
               </a:r>
-              <a:endParaRPr lang="en-US" sz="1100" b="0" i="0" u="none" strike="noStrike" kern="1200" cap="none" spc="0" baseline="0">
+              <a:endParaRPr lang="en-US" sz="1100" b="0" i="0" u="none" strike="noStrike" kern="1200" cap="none" spc="0" baseline="0" dirty="0">
                 <a:solidFill>
                   <a:srgbClr val="000000"/>
                 </a:solidFill>
@@ -12049,7 +12060,7 @@
                 </a:defRPr>
               </a:pPr>
               <a:r>
-                <a:rPr lang="fr-FR" sz="1100" b="0" i="0" u="none" strike="noStrike" kern="1200" cap="none" spc="0" baseline="0">
+                <a:rPr lang="fr-FR" sz="1100" b="0" i="0" u="none" strike="noStrike" kern="1200" cap="none" spc="0" baseline="0" dirty="0">
                   <a:solidFill>
                     <a:srgbClr val="000000"/>
                   </a:solidFill>
@@ -12058,7 +12069,7 @@
                 </a:rPr>
                 <a:t>Analyse</a:t>
               </a:r>
-              <a:endParaRPr lang="en-US" sz="1100" b="0" i="0" u="none" strike="noStrike" kern="1200" cap="none" spc="0" baseline="0">
+              <a:endParaRPr lang="en-US" sz="1100" b="0" i="0" u="none" strike="noStrike" kern="1200" cap="none" spc="0" baseline="0" dirty="0">
                 <a:solidFill>
                   <a:srgbClr val="000000"/>
                 </a:solidFill>
@@ -13276,6 +13287,7 @@
               </a:defRPr>
             </a:pPr>
             <a:fld id="{7388A1E6-5BAD-4D0B-853F-B69D3FF138EB}" type="slidenum">
+              <a:rPr/>
               <a:t>2</a:t>
             </a:fld>
             <a:endParaRPr lang="en-US" sz="1200" b="0" i="0" u="none" strike="noStrike" kern="1200" cap="none" spc="0" baseline="0">
@@ -13664,6 +13676,7 @@
               </a:defRPr>
             </a:pPr>
             <a:fld id="{4ADDD9E6-3AC3-4AB5-AA67-7C1152D46DBA}" type="slidenum">
+              <a:rPr/>
               <a:t>3</a:t>
             </a:fld>
             <a:endParaRPr lang="en-US" sz="1200" b="0" i="0" u="none" strike="noStrike" kern="1200" cap="none" spc="0" baseline="0">
@@ -14841,6 +14854,7 @@
               </a:defRPr>
             </a:pPr>
             <a:fld id="{9F774BAF-7C44-4B1C-99D7-B70C6D27ADF9}" type="slidenum">
+              <a:rPr/>
               <a:t>6</a:t>
             </a:fld>
             <a:endParaRPr lang="en-US" sz="1200" b="0" i="0" u="none" strike="noStrike" kern="1200" cap="none" spc="0" baseline="0">
@@ -15574,6 +15588,7 @@
               </a:defRPr>
             </a:pPr>
             <a:fld id="{95A76B32-C223-4885-8CD9-51706D0B49ED}" type="slidenum">
+              <a:rPr/>
               <a:t>7</a:t>
             </a:fld>
             <a:endParaRPr lang="en-US" sz="1200" b="0" i="0" u="none" strike="noStrike" kern="1200" cap="none" spc="0" baseline="0">
@@ -15741,8 +15756,8 @@
           </a:xfrm>
         </p:spPr>
         <p:txBody>
-          <a:bodyPr>
-            <a:normAutofit fontScale="47500" lnSpcReduction="20000"/>
+          <a:bodyPr numCol="2" spcCol="108000">
+            <a:normAutofit fontScale="92500"/>
           </a:bodyPr>
           <a:lstStyle/>
           <a:p>
@@ -15753,7 +15768,7 @@
               <a:buChar char="•"/>
             </a:pPr>
             <a:r>
-              <a:rPr lang="fr-FR" sz="1500"/>
+              <a:rPr lang="fr-FR" sz="1600" dirty="0"/>
               <a:t>Recherche de données</a:t>
             </a:r>
           </a:p>
@@ -15765,7 +15780,7 @@
               <a:buChar char="•"/>
             </a:pPr>
             <a:r>
-              <a:rPr lang="fr-FR" sz="1500"/>
+              <a:rPr lang="fr-FR" sz="1600" dirty="0"/>
               <a:t>Le site web</a:t>
             </a:r>
           </a:p>
@@ -15777,7 +15792,7 @@
               <a:buChar char="•"/>
             </a:pPr>
             <a:r>
-              <a:rPr lang="fr-FR" sz="1500"/>
+              <a:rPr lang="fr-FR" sz="1600" dirty="0"/>
               <a:t>La carte interactive</a:t>
             </a:r>
           </a:p>
@@ -15789,7 +15804,7 @@
               <a:buChar char="•"/>
             </a:pPr>
             <a:r>
-              <a:rPr lang="fr-FR" sz="1500"/>
+              <a:rPr lang="fr-FR" sz="1600" dirty="0"/>
               <a:t>Le Scrapping des données</a:t>
             </a:r>
           </a:p>
@@ -15801,9 +15816,14 @@
               <a:buChar char="•"/>
             </a:pPr>
             <a:r>
-              <a:rPr lang="fr-FR" sz="1500"/>
-              <a:t>L’analyse du dataset</a:t>
+              <a:rPr lang="fr-FR" sz="1600" dirty="0"/>
+              <a:t>L’analyse du </a:t>
             </a:r>
+            <a:r>
+              <a:rPr lang="fr-FR" sz="1600" dirty="0" err="1"/>
+              <a:t>dataset</a:t>
+            </a:r>
+            <a:endParaRPr lang="fr-FR" sz="1600" dirty="0"/>
           </a:p>
         </p:txBody>
       </p:sp>
@@ -15988,6 +16008,7 @@
               </a:defRPr>
             </a:pPr>
             <a:fld id="{00839284-E1C8-43D4-98BE-55455FEDF53E}" type="slidenum">
+              <a:rPr/>
               <a:t>8</a:t>
             </a:fld>
             <a:endParaRPr lang="en-US" sz="1200" b="0" i="0" u="none" strike="noStrike" kern="1200" cap="none" spc="0" baseline="0">
@@ -16945,6 +16966,7 @@
               </a:defRPr>
             </a:pPr>
             <a:fld id="{DE81DD7B-212B-4B94-8B54-FB804F871A62}" type="slidenum">
+              <a:rPr/>
               <a:t>9</a:t>
             </a:fld>
             <a:endParaRPr lang="en-US" sz="1200" b="0" i="0" u="none" strike="noStrike" kern="1200" cap="none" spc="0" baseline="0">

</xml_diff>

<commit_message>
ajout des video de présentation d'Aymeric
</commit_message>
<xml_diff>
--- a/Presentation Oral/Présentation Avril.pptx
+++ b/Presentation Oral/Présentation Avril.pptx
@@ -8933,6 +8933,7 @@
               </a:defRPr>
             </a:pPr>
             <a:fld id="{C6A3B68F-F832-4876-8ABF-98F26D30E2FF}" type="slidenum">
+              <a:rPr/>
               <a:t>14</a:t>
             </a:fld>
             <a:endParaRPr lang="en-US" sz="1200" b="0" i="0" u="none" strike="noStrike" kern="1200" cap="none" spc="0" baseline="0">
@@ -9104,6 +9105,7 @@
               </a:defRPr>
             </a:pPr>
             <a:fld id="{2251693B-A7EF-4B13-82F6-7966A5905929}" type="slidenum">
+              <a:rPr/>
               <a:t>15</a:t>
             </a:fld>
             <a:endParaRPr lang="en-US" sz="1200" b="0" i="0" u="none" strike="noStrike" kern="1200" cap="none" spc="0" baseline="0">
@@ -9193,44 +9195,54 @@
           <a:p>
             <a:pPr lvl="0"/>
             <a:r>
-              <a:rPr lang="fr-FR"/>
+              <a:rPr lang="fr-FR" dirty="0"/>
               <a:t>Faible quantité de données :</a:t>
             </a:r>
           </a:p>
           <a:p>
             <a:pPr lvl="1"/>
             <a:r>
-              <a:rPr lang="fr-FR"/>
+              <a:rPr lang="fr-FR" dirty="0"/>
               <a:t>Pouvant biaiser les statistiques</a:t>
             </a:r>
           </a:p>
           <a:p>
             <a:pPr lvl="1"/>
             <a:r>
-              <a:rPr lang="fr-FR"/>
+              <a:rPr lang="fr-FR" dirty="0"/>
               <a:t>Augmentant le temps passé à chercher de la data</a:t>
             </a:r>
           </a:p>
           <a:p>
             <a:pPr lvl="0"/>
             <a:r>
-              <a:rPr lang="fr-FR"/>
+              <a:rPr lang="fr-FR" dirty="0"/>
               <a:t>Isolement et indisponibilités dû aux circonstances actuelles</a:t>
             </a:r>
           </a:p>
           <a:p>
             <a:pPr lvl="1"/>
             <a:r>
-              <a:rPr lang="fr-FR"/>
-              <a:t>Faible débit de connexion ralentissant le scrapping</a:t>
+              <a:rPr lang="fr-FR" dirty="0"/>
+              <a:t>Faible débit de connexion ralentissant le </a:t>
             </a:r>
+            <a:r>
+              <a:rPr lang="fr-FR" dirty="0" err="1"/>
+              <a:t>scrapping</a:t>
+            </a:r>
+            <a:endParaRPr lang="fr-FR" dirty="0"/>
           </a:p>
           <a:p>
             <a:pPr lvl="1"/>
             <a:r>
+              <a:rPr lang="fr-FR" dirty="0"/>
+              <a:t>Communication plus difficile et développement </a:t>
+            </a:r>
+            <a:r>
               <a:rPr lang="fr-FR"/>
-              <a:t>…</a:t>
+              <a:t>moins collaboratif</a:t>
             </a:r>
+            <a:endParaRPr lang="fr-FR" dirty="0"/>
           </a:p>
         </p:txBody>
       </p:sp>
@@ -9285,6 +9297,7 @@
               </a:defRPr>
             </a:pPr>
             <a:fld id="{D98A83C5-1574-414A-A462-33F804177C72}" type="slidenum">
+              <a:rPr/>
               <a:t>16</a:t>
             </a:fld>
             <a:endParaRPr lang="en-US" sz="1200" b="0" i="0" u="none" strike="noStrike" kern="1200" cap="none" spc="0" baseline="0">
@@ -9477,6 +9490,7 @@
               </a:defRPr>
             </a:pPr>
             <a:fld id="{B07BBB67-A25A-433C-B0EC-8279287B48DD}" type="slidenum">
+              <a:rPr/>
               <a:t>17</a:t>
             </a:fld>
             <a:endParaRPr lang="en-US" sz="1200" b="0" i="0" u="none" strike="noStrike" kern="1200" cap="none" spc="0" baseline="0">
@@ -10181,16 +10195,13 @@
           <a:p>
             <a:pPr lvl="0" algn="ctr"/>
             <a:r>
-              <a:rPr lang="en-US">
-                <a:hlinkClick r:id="rId2"/>
-              </a:rPr>
-              <a:t>http://lif.sci-web.net/~toufer/public/</a:t>
+              <a:rPr lang="en-US" dirty="0"/>
+              <a:t>http://lif.sci-web.net/~toufer/</a:t>
             </a:r>
-            <a:endParaRPr lang="en-US"/>
           </a:p>
           <a:p>
             <a:pPr lvl="0" algn="ctr"/>
-            <a:endParaRPr lang="fr-FR"/>
+            <a:endParaRPr lang="fr-FR" dirty="0"/>
           </a:p>
         </p:txBody>
       </p:sp>

</xml_diff>